<commit_message>
Updated Day 3 - Slides and Supporting Materials.
</commit_message>
<xml_diff>
--- a/Day 1/Slides/7. Introduction to AWS Service Catalog/intro-aws-service-catalog-slides.pptx
+++ b/Day 1/Slides/7. Introduction to AWS Service Catalog/intro-aws-service-catalog-slides.pptx
@@ -4834,24 +4834,6 @@
         <p:nvPr/>
       </p:nvGrpSpPr>
       <p:grpSpPr/>
-      <p:sp>
-        <p:nvSpPr>
-          <p:cNvPr id="2" name="Title 1"/>
-          <p:cNvSpPr>
-            <a:spLocks noGrp="1"/>
-          </p:cNvSpPr>
-          <p:nvPr>
-            <p:ph type="title"/>
-          </p:nvPr>
-        </p:nvSpPr>
-        <p:spPr/>
-        <p:txBody>
-          <a:bodyPr/>
-          <a:p>
-            <a:endParaRPr lang="en-US"/>
-          </a:p>
-        </p:txBody>
-      </p:sp>
       <p:sp>
         <p:nvSpPr>
           <p:cNvPr id="5" name="Slide Number Placeholder 4"/>

</xml_diff>